<commit_message>
add R resouces document
</commit_message>
<xml_diff>
--- a/Statistical-Modeling-and-Regression.pptx
+++ b/Statistical-Modeling-and-Regression.pptx
@@ -21,12 +21,6 @@
     <p:sldId id="259" r:id="rId16"/>
     <p:sldId id="260" r:id="rId17"/>
     <p:sldId id="261" r:id="rId18"/>
-    <p:sldId id="262" r:id="rId19"/>
-    <p:sldId id="263" r:id="rId20"/>
-    <p:sldId id="264" r:id="rId21"/>
-    <p:sldId id="265" r:id="rId22"/>
-    <p:sldId id="266" r:id="rId23"/>
-    <p:sldId id="267" r:id="rId24"/>
   </p:sldIdLst>
   <p:sldSz cx="9144000" cy="6858000"/>
   <p:notesSz cx="7559675" cy="10691813"/>
@@ -164,7 +158,7 @@
         <p:txBody>
           <a:bodyPr/>
           <a:p>
-            <a:fld id="{1B0745E4-21C3-4051-B85E-4705731D2E9D}" type="slidenum">
+            <a:fld id="{320C76CF-56F2-41F5-9F88-40A8456F9080}" type="slidenum">
               <a:t>&lt;#&gt;</a:t>
             </a:fld>
           </a:p>
@@ -247,7 +241,7 @@
         <p:txBody>
           <a:bodyPr/>
           <a:p>
-            <a:fld id="{1B288BE3-0723-4A82-81D4-AA3FC94E164F}" type="slidenum">
+            <a:fld id="{5D5254BA-1884-4B9B-9FB7-C2323E600B69}" type="slidenum">
               <a:t>&lt;#&gt;</a:t>
             </a:fld>
           </a:p>
@@ -330,7 +324,7 @@
         <p:txBody>
           <a:bodyPr/>
           <a:p>
-            <a:fld id="{71CF76DB-731D-43AB-941D-C6518E9DDDC0}" type="slidenum">
+            <a:fld id="{2169E87C-BB59-45CA-B834-AC40A12B4599}" type="slidenum">
               <a:t>&lt;#&gt;</a:t>
             </a:fld>
           </a:p>
@@ -413,7 +407,7 @@
         <p:txBody>
           <a:bodyPr/>
           <a:p>
-            <a:fld id="{57A9ABFD-9F7B-4896-8944-E7505308A1E0}" type="slidenum">
+            <a:fld id="{B1F89CAE-6B3F-4384-9536-B1DAF052E465}" type="slidenum">
               <a:t>&lt;#&gt;</a:t>
             </a:fld>
           </a:p>
@@ -496,7 +490,7 @@
         <p:txBody>
           <a:bodyPr/>
           <a:p>
-            <a:fld id="{72E2E19A-0E3D-4E7C-BA0A-631552E88F4A}" type="slidenum">
+            <a:fld id="{3B0DDDFF-4BF1-47BD-A4CB-BDD659618B28}" type="slidenum">
               <a:t>&lt;#&gt;</a:t>
             </a:fld>
           </a:p>
@@ -579,7 +573,7 @@
         <p:txBody>
           <a:bodyPr/>
           <a:p>
-            <a:fld id="{8E1463F5-A41F-446D-B718-45CC96F45068}" type="slidenum">
+            <a:fld id="{CDD149B9-3CD3-4A49-B155-7A80921567B5}" type="slidenum">
               <a:t>&lt;#&gt;</a:t>
             </a:fld>
           </a:p>
@@ -662,7 +656,7 @@
         <p:txBody>
           <a:bodyPr/>
           <a:p>
-            <a:fld id="{E7460307-40C6-48F0-9683-AFFA6BAE9EEA}" type="slidenum">
+            <a:fld id="{0157F22B-85AD-4EEB-894F-89F68FFC900B}" type="slidenum">
               <a:t>&lt;#&gt;</a:t>
             </a:fld>
           </a:p>
@@ -828,7 +822,7 @@
         <p:txBody>
           <a:bodyPr/>
           <a:p>
-            <a:fld id="{C23570BA-878A-4655-ADFC-2F264578518B}" type="slidenum">
+            <a:fld id="{C8B22C21-84BA-48EF-B364-BC87D72830DA}" type="slidenum">
               <a:t>&lt;#&gt;</a:t>
             </a:fld>
           </a:p>
@@ -911,7 +905,7 @@
         <p:txBody>
           <a:bodyPr/>
           <a:p>
-            <a:fld id="{D9FC03A6-AA45-45B7-AEF6-EB63E587D62B}" type="slidenum">
+            <a:fld id="{06E04168-FB98-409A-B130-70FAE82A53B2}" type="slidenum">
               <a:t>&lt;#&gt;</a:t>
             </a:fld>
           </a:p>
@@ -1120,7 +1114,7 @@
         <p:txBody>
           <a:bodyPr/>
           <a:p>
-            <a:fld id="{0D55D8C9-982D-4671-B8E7-CB311AE8A6A0}" type="slidenum">
+            <a:fld id="{83A5E5ED-86FF-4C29-BBEC-10F292F82248}" type="slidenum">
               <a:t>&lt;#&gt;</a:t>
             </a:fld>
           </a:p>
@@ -1203,7 +1197,7 @@
         <p:txBody>
           <a:bodyPr/>
           <a:p>
-            <a:fld id="{CAD0C30D-D13B-42F4-B5C5-8E34D320A515}" type="slidenum">
+            <a:fld id="{71736655-3D4A-4ECF-8C14-2007AC50840D}" type="slidenum">
               <a:t>&lt;#&gt;</a:t>
             </a:fld>
           </a:p>
@@ -1326,7 +1320,7 @@
         <p:txBody>
           <a:bodyPr/>
           <a:p>
-            <a:fld id="{CCAE29AB-ED83-43ED-B6C2-7C41B69C7CA7}" type="slidenum">
+            <a:fld id="{82BB6DE2-7C9B-4ACF-944D-26FB3F3DB2B4}" type="slidenum">
               <a:t>&lt;#&gt;</a:t>
             </a:fld>
           </a:p>
@@ -1420,7 +1414,16 @@
                 </a:solidFill>
                 <a:latin typeface="Arial"/>
               </a:rPr>
-              <a:t>Click to edit the title text format</a:t>
+              <a:t>Click to edit the title text </a:t>
+            </a:r>
+            <a:r>
+              <a:rPr b="0" lang="en-US" sz="1800" spc="-1" strike="noStrike">
+                <a:solidFill>
+                  <a:srgbClr val="000000"/>
+                </a:solidFill>
+                <a:latin typeface="Arial"/>
+              </a:rPr>
+              <a:t>format</a:t>
             </a:r>
             <a:endParaRPr b="0" lang="en-US" sz="1800" spc="-1" strike="noStrike">
               <a:solidFill>
@@ -1559,7 +1562,7 @@
                 <a:tab algn="l" pos="0"/>
               </a:tabLst>
             </a:pPr>
-            <a:fld id="{CE589BFA-B834-4247-BA17-26C0BDE3C8E3}" type="slidenum">
+            <a:fld id="{AC102D29-C420-4314-BC2D-AD952C01982E}" type="slidenum">
               <a:rPr b="0" lang="en-US" sz="1200" spc="-1" strike="noStrike">
                 <a:solidFill>
                   <a:schemeClr val="dk1">
@@ -2025,7 +2028,7 @@
                 <a:tab algn="l" pos="0"/>
               </a:tabLst>
             </a:pPr>
-            <a:fld id="{B36FAA30-69E6-4CDB-92B1-CFCE02144042}" type="slidenum">
+            <a:fld id="{E93DBDC7-1C0C-4218-953B-D38C4633C195}" type="slidenum">
               <a:rPr b="0" lang="en-US" sz="1200" spc="-1" strike="noStrike">
                 <a:solidFill>
                   <a:schemeClr val="dk1">
@@ -2266,7 +2269,7 @@
                 <a:tab algn="l" pos="0"/>
               </a:tabLst>
             </a:pPr>
-            <a:fld id="{A8C06AF0-F767-4778-8DD4-58189FDB7EE0}" type="slidenum">
+            <a:fld id="{B55C5CD1-9CAF-4E38-97B3-2BEDEE20C06F}" type="slidenum">
               <a:rPr b="0" lang="en-US" sz="1200" spc="-1" strike="noStrike">
                 <a:solidFill>
                   <a:schemeClr val="dk1">
@@ -2507,7 +2510,7 @@
                 <a:tab algn="l" pos="0"/>
               </a:tabLst>
             </a:pPr>
-            <a:fld id="{BD3FEB96-55AF-4E74-8482-14452D1AED26}" type="slidenum">
+            <a:fld id="{68F9635B-5EF9-4434-95CE-7ACD27D88B95}" type="slidenum">
               <a:rPr b="0" lang="en-US" sz="1200" spc="-1" strike="noStrike">
                 <a:solidFill>
                   <a:schemeClr val="dk1">
@@ -2748,7 +2751,7 @@
                 <a:tab algn="l" pos="0"/>
               </a:tabLst>
             </a:pPr>
-            <a:fld id="{06779E8F-18EA-4133-BD0C-D817B6EA421A}" type="slidenum">
+            <a:fld id="{F1148277-7E33-45E0-9EC1-1A8C584F5480}" type="slidenum">
               <a:rPr b="0" lang="en-US" sz="1200" spc="-1" strike="noStrike">
                 <a:solidFill>
                   <a:schemeClr val="dk1">
@@ -2899,7 +2902,16 @@
                 </a:solidFill>
                 <a:latin typeface="Arial"/>
               </a:rPr>
-              <a:t>Click to edit the title text format</a:t>
+              <a:t>Click to edit the title text </a:t>
+            </a:r>
+            <a:r>
+              <a:rPr b="0" lang="en-US" sz="1800" spc="-1" strike="noStrike">
+                <a:solidFill>
+                  <a:srgbClr val="000000"/>
+                </a:solidFill>
+                <a:latin typeface="Arial"/>
+              </a:rPr>
+              <a:t>format</a:t>
             </a:r>
             <a:endParaRPr b="0" lang="en-US" sz="1800" spc="-1" strike="noStrike">
               <a:solidFill>
@@ -3263,7 +3275,7 @@
                 <a:tab algn="l" pos="0"/>
               </a:tabLst>
             </a:pPr>
-            <a:fld id="{11814590-0AAD-4661-A3AC-20DAA78BA16B}" type="slidenum">
+            <a:fld id="{EDC5922A-BB48-4450-A647-1D45C4354C86}" type="slidenum">
               <a:rPr b="0" lang="en-US" sz="1200" spc="-1" strike="noStrike">
                 <a:solidFill>
                   <a:schemeClr val="dk1">
@@ -3505,7 +3517,7 @@
                 <a:tab algn="l" pos="0"/>
               </a:tabLst>
             </a:pPr>
-            <a:fld id="{079E7E03-74EE-43F6-A250-10209788A714}" type="slidenum">
+            <a:fld id="{12376374-293C-4705-8DB7-D946E9821775}" type="slidenum">
               <a:rPr b="0" lang="en-US" sz="1200" spc="-1" strike="noStrike">
                 <a:solidFill>
                   <a:schemeClr val="dk1">
@@ -4245,7 +4257,7 @@
                 <a:tab algn="l" pos="0"/>
               </a:tabLst>
             </a:pPr>
-            <a:fld id="{F5F91E00-9B9A-45AF-9563-F6A031A8912E}" type="slidenum">
+            <a:fld id="{ACDCD982-2FBF-4B29-A03E-48B184DCFA4D}" type="slidenum">
               <a:rPr b="0" lang="en-US" sz="1200" spc="-1" strike="noStrike">
                 <a:solidFill>
                   <a:schemeClr val="dk1">
@@ -4486,7 +4498,7 @@
                 <a:tab algn="l" pos="0"/>
               </a:tabLst>
             </a:pPr>
-            <a:fld id="{4AB551E0-AA4E-49F2-A019-26FF29641265}" type="slidenum">
+            <a:fld id="{96945903-40FF-4F5C-B18F-4508F73B3110}" type="slidenum">
               <a:rPr b="0" lang="en-US" sz="1200" spc="-1" strike="noStrike">
                 <a:solidFill>
                   <a:schemeClr val="dk1">
@@ -4776,7 +4788,7 @@
                 <a:tab algn="l" pos="0"/>
               </a:tabLst>
             </a:pPr>
-            <a:fld id="{59AA51DF-93B0-44AB-8A59-19B0F121FA78}" type="slidenum">
+            <a:fld id="{D714B2E0-E6BC-435E-8118-6ADAE16C67ED}" type="slidenum">
               <a:rPr b="0" lang="en-US" sz="1200" spc="-1" strike="noStrike">
                 <a:solidFill>
                   <a:schemeClr val="dk1">
@@ -5017,7 +5029,7 @@
                 <a:tab algn="l" pos="0"/>
               </a:tabLst>
             </a:pPr>
-            <a:fld id="{6EFD5070-DA96-4966-97F9-B5BFD63DF2BB}" type="slidenum">
+            <a:fld id="{E2FBD0EC-845A-49C0-A1F8-24ECF85676F3}" type="slidenum">
               <a:rPr b="0" lang="en-US" sz="1200" spc="-1" strike="noStrike">
                 <a:solidFill>
                   <a:schemeClr val="dk1">
@@ -5267,18 +5279,7 @@
                 </a:solidFill>
                 <a:latin typeface="Calibri"/>
               </a:rPr>
-              <a:t>Software Developer &amp; </a:t>
-            </a:r>
-            <a:r>
-              <a:rPr b="0" lang="en-US" sz="3200" spc="-1" strike="noStrike">
-                <a:solidFill>
-                  <a:schemeClr val="dk1">
-                    <a:tint val="75000"/>
-                  </a:schemeClr>
-                </a:solidFill>
-                <a:latin typeface="Calibri"/>
-              </a:rPr>
-              <a:t>Data Scientist</a:t>
+              <a:t>Software Developer &amp; Data Scientist</a:t>
             </a:r>
             <a:endParaRPr b="0" lang="en-US" sz="3200" spc="-1" strike="noStrike">
               <a:solidFill>
@@ -5391,770 +5392,6 @@
                 <a:srgbClr val="000000"/>
               </a:solidFill>
               <a:latin typeface="Calibri"/>
-            </a:endParaRPr>
-          </a:p>
-        </p:txBody>
-      </p:sp>
-    </p:spTree>
-  </p:cSld>
-  <mc:AlternateContent>
-    <mc:Choice Requires="p14">
-      <p:transition spd="slow" p14:dur="2000"/>
-    </mc:Choice>
-    <mc:Fallback>
-      <p:transition spd="slow"/>
-    </mc:Fallback>
-  </mc:AlternateContent>
-</p:sld>
-</file>
-
-<file path=ppt/slides/slide10.xml><?xml version="1.0" encoding="utf-8"?>
-<p:sld xmlns:a="http://schemas.openxmlformats.org/drawingml/2006/main" xmlns:p="http://schemas.openxmlformats.org/presentationml/2006/main" xmlns:r="http://schemas.openxmlformats.org/officeDocument/2006/relationships" xmlns:p14="http://schemas.microsoft.com/office/powerpoint/2010/main" xmlns:p15="http://schemas.microsoft.com/office/powerpoint/2012/main" xmlns:mc="http://schemas.openxmlformats.org/markup-compatibility/2006">
-  <p:cSld>
-    <p:spTree>
-      <p:nvGrpSpPr>
-        <p:cNvPr id="1" name=""/>
-        <p:cNvGrpSpPr/>
-        <p:nvPr/>
-      </p:nvGrpSpPr>
-      <p:grpSpPr>
-        <a:xfrm>
-          <a:off x="0" y="0"/>
-          <a:ext cx="0" cy="0"/>
-          <a:chOff x="0" y="0"/>
-          <a:chExt cx="0" cy="0"/>
-        </a:xfrm>
-      </p:grpSpPr>
-      <p:sp>
-        <p:nvSpPr>
-          <p:cNvPr id="68" name="PlaceHolder 1"/>
-          <p:cNvSpPr>
-            <a:spLocks noGrp="1"/>
-          </p:cNvSpPr>
-          <p:nvPr>
-            <p:ph type="title"/>
-          </p:nvPr>
-        </p:nvSpPr>
-        <p:spPr>
-          <a:xfrm>
-            <a:off x="457200" y="274680"/>
-            <a:ext cx="8227080" cy="1140480"/>
-          </a:xfrm>
-          <a:prstGeom prst="rect">
-            <a:avLst/>
-          </a:prstGeom>
-          <a:noFill/>
-          <a:ln w="0">
-            <a:noFill/>
-          </a:ln>
-        </p:spPr>
-        <p:txBody>
-          <a:bodyPr lIns="91440" rIns="91440" tIns="45720" bIns="45720" anchor="ctr">
-            <a:noAutofit/>
-          </a:bodyPr>
-          <a:p>
-            <a:pPr indent="0" algn="ctr" defTabSz="457200">
-              <a:lnSpc>
-                <a:spcPct val="100000"/>
-              </a:lnSpc>
-              <a:spcBef>
-                <a:spcPts val="1191"/>
-              </a:spcBef>
-              <a:spcAft>
-                <a:spcPts val="992"/>
-              </a:spcAft>
-              <a:buNone/>
-              <a:tabLst>
-                <a:tab algn="l" pos="0"/>
-              </a:tabLst>
-            </a:pPr>
-            <a:r>
-              <a:rPr b="0" lang="en-US" sz="4400" spc="-1" strike="noStrike">
-                <a:solidFill>
-                  <a:srgbClr val="000000"/>
-                </a:solidFill>
-                <a:latin typeface="Calibri"/>
-              </a:rPr>
-              <a:t>Scatter Plot – Age vs Score Colored by Programme</a:t>
-            </a:r>
-            <a:endParaRPr b="0" lang="en-US" sz="4400" spc="-1" strike="noStrike">
-              <a:solidFill>
-                <a:srgbClr val="000000"/>
-              </a:solidFill>
-              <a:latin typeface="Arial"/>
-            </a:endParaRPr>
-          </a:p>
-        </p:txBody>
-      </p:sp>
-      <p:sp>
-        <p:nvSpPr>
-          <p:cNvPr id="69" name="PlaceHolder 2"/>
-          <p:cNvSpPr>
-            <a:spLocks noGrp="1"/>
-          </p:cNvSpPr>
-          <p:nvPr>
-            <p:ph/>
-          </p:nvPr>
-        </p:nvSpPr>
-        <p:spPr>
-          <a:xfrm>
-            <a:off x="457200" y="1600200"/>
-            <a:ext cx="8227080" cy="4523400"/>
-          </a:xfrm>
-          <a:prstGeom prst="rect">
-            <a:avLst/>
-          </a:prstGeom>
-          <a:noFill/>
-          <a:ln w="0">
-            <a:noFill/>
-          </a:ln>
-        </p:spPr>
-        <p:txBody>
-          <a:bodyPr lIns="91440" rIns="91440" tIns="45720" bIns="45720" anchor="t">
-            <a:noAutofit/>
-          </a:bodyPr>
-          <a:p>
-            <a:pPr marL="343080" indent="0" defTabSz="457200">
-              <a:lnSpc>
-                <a:spcPct val="100000"/>
-              </a:lnSpc>
-              <a:spcBef>
-                <a:spcPts val="641"/>
-              </a:spcBef>
-              <a:buNone/>
-            </a:pPr>
-            <a:r>
-              <a:rPr b="0" lang="en-US" sz="3200" spc="-1" strike="noStrike">
-                <a:solidFill>
-                  <a:schemeClr val="dk1"/>
-                </a:solidFill>
-                <a:latin typeface="Calibri"/>
-                <a:ea typeface="Noto Sans Mono CJK SC"/>
-              </a:rPr>
-              <a:t>ggplot(students, aes(x = Age, y = Score, color = Programme)) +</a:t>
-            </a:r>
-            <a:endParaRPr b="0" lang="en-US" sz="3200" spc="-1" strike="noStrike">
-              <a:solidFill>
-                <a:srgbClr val="000000"/>
-              </a:solidFill>
-              <a:latin typeface="Arial"/>
-            </a:endParaRPr>
-          </a:p>
-          <a:p>
-            <a:pPr marL="343080" indent="0" defTabSz="457200">
-              <a:lnSpc>
-                <a:spcPct val="100000"/>
-              </a:lnSpc>
-              <a:spcBef>
-                <a:spcPts val="641"/>
-              </a:spcBef>
-              <a:buNone/>
-            </a:pPr>
-            <a:r>
-              <a:rPr b="0" lang="en-US" sz="3200" spc="-1" strike="noStrike">
-                <a:solidFill>
-                  <a:schemeClr val="dk1"/>
-                </a:solidFill>
-                <a:latin typeface="Calibri"/>
-                <a:ea typeface="Noto Sans Mono CJK SC"/>
-              </a:rPr>
-              <a:t>  </a:t>
-            </a:r>
-            <a:r>
-              <a:rPr b="0" lang="en-US" sz="3200" spc="-1" strike="noStrike">
-                <a:solidFill>
-                  <a:schemeClr val="dk1"/>
-                </a:solidFill>
-                <a:latin typeface="Calibri"/>
-                <a:ea typeface="Noto Sans Mono CJK SC"/>
-              </a:rPr>
-              <a:t>geom_point(alpha = 0.6) +</a:t>
-            </a:r>
-            <a:endParaRPr b="0" lang="en-US" sz="3200" spc="-1" strike="noStrike">
-              <a:solidFill>
-                <a:srgbClr val="000000"/>
-              </a:solidFill>
-              <a:latin typeface="Arial"/>
-            </a:endParaRPr>
-          </a:p>
-          <a:p>
-            <a:pPr marL="343080" indent="0" defTabSz="457200">
-              <a:lnSpc>
-                <a:spcPct val="100000"/>
-              </a:lnSpc>
-              <a:spcBef>
-                <a:spcPts val="641"/>
-              </a:spcBef>
-              <a:buNone/>
-            </a:pPr>
-            <a:r>
-              <a:rPr b="0" lang="en-US" sz="3200" spc="-1" strike="noStrike">
-                <a:solidFill>
-                  <a:schemeClr val="dk1"/>
-                </a:solidFill>
-                <a:latin typeface="Calibri"/>
-                <a:ea typeface="Noto Sans Mono CJK SC"/>
-              </a:rPr>
-              <a:t> </a:t>
-            </a:r>
-            <a:r>
-              <a:rPr b="0" lang="en-US" sz="3200" spc="-1" strike="noStrike">
-                <a:solidFill>
-                  <a:schemeClr val="dk1"/>
-                </a:solidFill>
-                <a:latin typeface="Calibri"/>
-                <a:ea typeface="Noto Sans Mono CJK SC"/>
-              </a:rPr>
-              <a:t>labs(title = "Score vs Age by Programme", x = "Age", y = "Score") +</a:t>
-            </a:r>
-            <a:endParaRPr b="0" lang="en-US" sz="3200" spc="-1" strike="noStrike">
-              <a:solidFill>
-                <a:srgbClr val="000000"/>
-              </a:solidFill>
-              <a:latin typeface="Arial"/>
-            </a:endParaRPr>
-          </a:p>
-          <a:p>
-            <a:pPr marL="343080" indent="0" defTabSz="457200">
-              <a:lnSpc>
-                <a:spcPct val="100000"/>
-              </a:lnSpc>
-              <a:spcBef>
-                <a:spcPts val="641"/>
-              </a:spcBef>
-              <a:buNone/>
-            </a:pPr>
-            <a:r>
-              <a:rPr b="0" lang="en-US" sz="3200" spc="-1" strike="noStrike">
-                <a:solidFill>
-                  <a:schemeClr val="dk1"/>
-                </a:solidFill>
-                <a:latin typeface="Calibri"/>
-                <a:ea typeface="Noto Sans Mono CJK SC"/>
-              </a:rPr>
-              <a:t>  </a:t>
-            </a:r>
-            <a:r>
-              <a:rPr b="0" lang="en-US" sz="3200" spc="-1" strike="noStrike">
-                <a:solidFill>
-                  <a:schemeClr val="dk1"/>
-                </a:solidFill>
-                <a:latin typeface="Calibri"/>
-                <a:ea typeface="Noto Sans Mono CJK SC"/>
-              </a:rPr>
-              <a:t>theme_minimal()</a:t>
-            </a:r>
-            <a:endParaRPr b="0" lang="en-US" sz="3200" spc="-1" strike="noStrike">
-              <a:solidFill>
-                <a:srgbClr val="000000"/>
-              </a:solidFill>
-              <a:latin typeface="Arial"/>
-            </a:endParaRPr>
-          </a:p>
-        </p:txBody>
-      </p:sp>
-    </p:spTree>
-  </p:cSld>
-  <mc:AlternateContent>
-    <mc:Choice Requires="p14">
-      <p:transition spd="slow" p14:dur="2000"/>
-    </mc:Choice>
-    <mc:Fallback>
-      <p:transition spd="slow"/>
-    </mc:Fallback>
-  </mc:AlternateContent>
-</p:sld>
-</file>
-
-<file path=ppt/slides/slide11.xml><?xml version="1.0" encoding="utf-8"?>
-<p:sld xmlns:a="http://schemas.openxmlformats.org/drawingml/2006/main" xmlns:p="http://schemas.openxmlformats.org/presentationml/2006/main" xmlns:r="http://schemas.openxmlformats.org/officeDocument/2006/relationships" xmlns:p14="http://schemas.microsoft.com/office/powerpoint/2010/main" xmlns:p15="http://schemas.microsoft.com/office/powerpoint/2012/main" xmlns:mc="http://schemas.openxmlformats.org/markup-compatibility/2006">
-  <p:cSld>
-    <p:spTree>
-      <p:nvGrpSpPr>
-        <p:cNvPr id="1" name=""/>
-        <p:cNvGrpSpPr/>
-        <p:nvPr/>
-      </p:nvGrpSpPr>
-      <p:grpSpPr>
-        <a:xfrm>
-          <a:off x="0" y="0"/>
-          <a:ext cx="0" cy="0"/>
-          <a:chOff x="0" y="0"/>
-          <a:chExt cx="0" cy="0"/>
-        </a:xfrm>
-      </p:grpSpPr>
-      <p:sp>
-        <p:nvSpPr>
-          <p:cNvPr id="70" name="PlaceHolder 1"/>
-          <p:cNvSpPr>
-            <a:spLocks noGrp="1"/>
-          </p:cNvSpPr>
-          <p:nvPr>
-            <p:ph type="title"/>
-          </p:nvPr>
-        </p:nvSpPr>
-        <p:spPr>
-          <a:xfrm>
-            <a:off x="457200" y="274680"/>
-            <a:ext cx="8227080" cy="1140480"/>
-          </a:xfrm>
-          <a:prstGeom prst="rect">
-            <a:avLst/>
-          </a:prstGeom>
-          <a:noFill/>
-          <a:ln w="0">
-            <a:noFill/>
-          </a:ln>
-        </p:spPr>
-        <p:txBody>
-          <a:bodyPr lIns="91440" rIns="91440" tIns="45720" bIns="45720" anchor="ctr">
-            <a:noAutofit/>
-          </a:bodyPr>
-          <a:p>
-            <a:pPr indent="0" algn="ctr" defTabSz="457200">
-              <a:lnSpc>
-                <a:spcPct val="100000"/>
-              </a:lnSpc>
-              <a:spcBef>
-                <a:spcPts val="1191"/>
-              </a:spcBef>
-              <a:spcAft>
-                <a:spcPts val="992"/>
-              </a:spcAft>
-              <a:buNone/>
-              <a:tabLst>
-                <a:tab algn="l" pos="0"/>
-              </a:tabLst>
-            </a:pPr>
-            <a:r>
-              <a:rPr b="0" lang="en-US" sz="4400" spc="-1" strike="noStrike">
-                <a:solidFill>
-                  <a:srgbClr val="000000"/>
-                </a:solidFill>
-                <a:latin typeface="Calibri"/>
-              </a:rPr>
-              <a:t>Faceted Plot – Score vs Age by Gender</a:t>
-            </a:r>
-            <a:endParaRPr b="0" lang="en-US" sz="4400" spc="-1" strike="noStrike">
-              <a:solidFill>
-                <a:srgbClr val="000000"/>
-              </a:solidFill>
-              <a:latin typeface="Arial"/>
-            </a:endParaRPr>
-          </a:p>
-        </p:txBody>
-      </p:sp>
-      <p:sp>
-        <p:nvSpPr>
-          <p:cNvPr id="71" name="PlaceHolder 2"/>
-          <p:cNvSpPr>
-            <a:spLocks noGrp="1"/>
-          </p:cNvSpPr>
-          <p:nvPr>
-            <p:ph/>
-          </p:nvPr>
-        </p:nvSpPr>
-        <p:spPr>
-          <a:xfrm>
-            <a:off x="457200" y="1600200"/>
-            <a:ext cx="8227080" cy="4523400"/>
-          </a:xfrm>
-          <a:prstGeom prst="rect">
-            <a:avLst/>
-          </a:prstGeom>
-          <a:noFill/>
-          <a:ln w="0">
-            <a:noFill/>
-          </a:ln>
-        </p:spPr>
-        <p:txBody>
-          <a:bodyPr lIns="91440" rIns="91440" tIns="45720" bIns="45720" anchor="t">
-            <a:noAutofit/>
-          </a:bodyPr>
-          <a:p>
-            <a:pPr marL="343080" indent="0" defTabSz="457200">
-              <a:lnSpc>
-                <a:spcPct val="100000"/>
-              </a:lnSpc>
-              <a:spcBef>
-                <a:spcPts val="641"/>
-              </a:spcBef>
-              <a:buNone/>
-            </a:pPr>
-            <a:r>
-              <a:rPr b="0" lang="en-US" sz="3200" spc="-1" strike="noStrike">
-                <a:solidFill>
-                  <a:schemeClr val="dk1"/>
-                </a:solidFill>
-                <a:latin typeface="Calibri"/>
-                <a:ea typeface="Noto Sans Mono CJK SC"/>
-              </a:rPr>
-              <a:t>ggplot(students, aes(x = Age, y = Score)) </a:t>
-            </a:r>
-            <a:r>
-              <a:rPr b="0" lang="en-US" sz="3200" spc="-1" strike="noStrike">
-                <a:solidFill>
-                  <a:schemeClr val="dk1"/>
-                </a:solidFill>
-                <a:latin typeface="Calibri"/>
-                <a:ea typeface="Noto Sans Mono CJK SC"/>
-              </a:rPr>
-              <a:t>+  geom_point(alpha = 0.5, color = </a:t>
-            </a:r>
-            <a:r>
-              <a:rPr b="0" lang="en-US" sz="3200" spc="-1" strike="noStrike">
-                <a:solidFill>
-                  <a:schemeClr val="dk1"/>
-                </a:solidFill>
-                <a:latin typeface="Calibri"/>
-                <a:ea typeface="Noto Sans Mono CJK SC"/>
-              </a:rPr>
-              <a:t>"purple") +</a:t>
-            </a:r>
-            <a:endParaRPr b="0" lang="en-US" sz="3200" spc="-1" strike="noStrike">
-              <a:solidFill>
-                <a:srgbClr val="000000"/>
-              </a:solidFill>
-              <a:latin typeface="Arial"/>
-            </a:endParaRPr>
-          </a:p>
-          <a:p>
-            <a:pPr marL="343080" indent="0" defTabSz="457200">
-              <a:lnSpc>
-                <a:spcPct val="100000"/>
-              </a:lnSpc>
-              <a:spcBef>
-                <a:spcPts val="641"/>
-              </a:spcBef>
-              <a:buNone/>
-            </a:pPr>
-            <a:r>
-              <a:rPr b="0" lang="en-US" sz="3200" spc="-1" strike="noStrike">
-                <a:solidFill>
-                  <a:schemeClr val="dk1"/>
-                </a:solidFill>
-                <a:latin typeface="Calibri"/>
-                <a:ea typeface="Noto Sans Mono CJK SC"/>
-              </a:rPr>
-              <a:t>facet_wrap(~ Gender) +</a:t>
-            </a:r>
-            <a:endParaRPr b="0" lang="en-US" sz="3200" spc="-1" strike="noStrike">
-              <a:solidFill>
-                <a:srgbClr val="000000"/>
-              </a:solidFill>
-              <a:latin typeface="Arial"/>
-            </a:endParaRPr>
-          </a:p>
-          <a:p>
-            <a:pPr marL="343080" indent="0" defTabSz="457200">
-              <a:lnSpc>
-                <a:spcPct val="100000"/>
-              </a:lnSpc>
-              <a:spcBef>
-                <a:spcPts val="641"/>
-              </a:spcBef>
-              <a:buNone/>
-            </a:pPr>
-            <a:r>
-              <a:rPr b="0" lang="en-US" sz="3200" spc="-1" strike="noStrike">
-                <a:solidFill>
-                  <a:schemeClr val="dk1"/>
-                </a:solidFill>
-                <a:latin typeface="Calibri"/>
-                <a:ea typeface="Noto Sans Mono CJK SC"/>
-              </a:rPr>
-              <a:t> </a:t>
-            </a:r>
-            <a:r>
-              <a:rPr b="0" lang="en-US" sz="3200" spc="-1" strike="noStrike">
-                <a:solidFill>
-                  <a:schemeClr val="dk1"/>
-                </a:solidFill>
-                <a:latin typeface="Calibri"/>
-                <a:ea typeface="Noto Sans Mono CJK SC"/>
-              </a:rPr>
-              <a:t>labs(title = "Score vs Age Faceted by </a:t>
-            </a:r>
-            <a:r>
-              <a:rPr b="0" lang="en-US" sz="3200" spc="-1" strike="noStrike">
-                <a:solidFill>
-                  <a:schemeClr val="dk1"/>
-                </a:solidFill>
-                <a:latin typeface="Calibri"/>
-                <a:ea typeface="Noto Sans Mono CJK SC"/>
-              </a:rPr>
-              <a:t>Gender") +  theme_minimal()</a:t>
-            </a:r>
-            <a:endParaRPr b="0" lang="en-US" sz="3200" spc="-1" strike="noStrike">
-              <a:solidFill>
-                <a:srgbClr val="000000"/>
-              </a:solidFill>
-              <a:latin typeface="Arial"/>
-            </a:endParaRPr>
-          </a:p>
-          <a:p>
-            <a:pPr marL="343080" indent="0" defTabSz="457200">
-              <a:lnSpc>
-                <a:spcPct val="100000"/>
-              </a:lnSpc>
-              <a:spcBef>
-                <a:spcPts val="641"/>
-              </a:spcBef>
-              <a:buNone/>
-            </a:pPr>
-            <a:endParaRPr b="0" lang="en-US" sz="3200" spc="-1" strike="noStrike">
-              <a:solidFill>
-                <a:srgbClr val="000000"/>
-              </a:solidFill>
-              <a:latin typeface="Arial"/>
-            </a:endParaRPr>
-          </a:p>
-        </p:txBody>
-      </p:sp>
-    </p:spTree>
-  </p:cSld>
-  <mc:AlternateContent>
-    <mc:Choice Requires="p14">
-      <p:transition spd="slow" p14:dur="2000"/>
-    </mc:Choice>
-    <mc:Fallback>
-      <p:transition spd="slow"/>
-    </mc:Fallback>
-  </mc:AlternateContent>
-</p:sld>
-</file>
-
-<file path=ppt/slides/slide12.xml><?xml version="1.0" encoding="utf-8"?>
-<p:sld xmlns:a="http://schemas.openxmlformats.org/drawingml/2006/main" xmlns:p="http://schemas.openxmlformats.org/presentationml/2006/main" xmlns:r="http://schemas.openxmlformats.org/officeDocument/2006/relationships" xmlns:p14="http://schemas.microsoft.com/office/powerpoint/2010/main" xmlns:p15="http://schemas.microsoft.com/office/powerpoint/2012/main" xmlns:mc="http://schemas.openxmlformats.org/markup-compatibility/2006">
-  <p:cSld>
-    <p:spTree>
-      <p:nvGrpSpPr>
-        <p:cNvPr id="1" name=""/>
-        <p:cNvGrpSpPr/>
-        <p:nvPr/>
-      </p:nvGrpSpPr>
-      <p:grpSpPr>
-        <a:xfrm>
-          <a:off x="0" y="0"/>
-          <a:ext cx="0" cy="0"/>
-          <a:chOff x="0" y="0"/>
-          <a:chExt cx="0" cy="0"/>
-        </a:xfrm>
-      </p:grpSpPr>
-      <p:sp>
-        <p:nvSpPr>
-          <p:cNvPr id="72" name="PlaceHolder 1"/>
-          <p:cNvSpPr>
-            <a:spLocks noGrp="1"/>
-          </p:cNvSpPr>
-          <p:nvPr>
-            <p:ph type="title"/>
-          </p:nvPr>
-        </p:nvSpPr>
-        <p:spPr>
-          <a:xfrm>
-            <a:off x="457200" y="274680"/>
-            <a:ext cx="8227080" cy="1140480"/>
-          </a:xfrm>
-          <a:prstGeom prst="rect">
-            <a:avLst/>
-          </a:prstGeom>
-          <a:noFill/>
-          <a:ln w="0">
-            <a:noFill/>
-          </a:ln>
-        </p:spPr>
-        <p:txBody>
-          <a:bodyPr lIns="91440" rIns="91440" tIns="45720" bIns="45720" anchor="ctr">
-            <a:noAutofit/>
-          </a:bodyPr>
-          <a:p>
-            <a:pPr indent="0" algn="ctr" defTabSz="457200">
-              <a:lnSpc>
-                <a:spcPct val="100000"/>
-              </a:lnSpc>
-              <a:spcBef>
-                <a:spcPts val="1191"/>
-              </a:spcBef>
-              <a:spcAft>
-                <a:spcPts val="992"/>
-              </a:spcAft>
-              <a:buNone/>
-              <a:tabLst>
-                <a:tab algn="l" pos="0"/>
-              </a:tabLst>
-            </a:pPr>
-            <a:r>
-              <a:rPr b="0" lang="en-US" sz="4400" spc="-1" strike="noStrike">
-                <a:solidFill>
-                  <a:srgbClr val="000000"/>
-                </a:solidFill>
-                <a:latin typeface="Calibri"/>
-              </a:rPr>
-              <a:t>Histogram – Score Distribution</a:t>
-            </a:r>
-            <a:endParaRPr b="0" lang="en-US" sz="4400" spc="-1" strike="noStrike">
-              <a:solidFill>
-                <a:srgbClr val="000000"/>
-              </a:solidFill>
-              <a:latin typeface="Arial"/>
-            </a:endParaRPr>
-          </a:p>
-        </p:txBody>
-      </p:sp>
-      <p:sp>
-        <p:nvSpPr>
-          <p:cNvPr id="73" name="PlaceHolder 2"/>
-          <p:cNvSpPr>
-            <a:spLocks noGrp="1"/>
-          </p:cNvSpPr>
-          <p:nvPr>
-            <p:ph/>
-          </p:nvPr>
-        </p:nvSpPr>
-        <p:spPr>
-          <a:xfrm>
-            <a:off x="457200" y="1600200"/>
-            <a:ext cx="8227080" cy="4523400"/>
-          </a:xfrm>
-          <a:prstGeom prst="rect">
-            <a:avLst/>
-          </a:prstGeom>
-          <a:noFill/>
-          <a:ln w="0">
-            <a:noFill/>
-          </a:ln>
-        </p:spPr>
-        <p:txBody>
-          <a:bodyPr lIns="91440" rIns="91440" tIns="45720" bIns="45720" anchor="t">
-            <a:noAutofit/>
-          </a:bodyPr>
-          <a:p>
-            <a:pPr marL="343080" indent="0" defTabSz="457200">
-              <a:lnSpc>
-                <a:spcPct val="100000"/>
-              </a:lnSpc>
-              <a:spcBef>
-                <a:spcPts val="641"/>
-              </a:spcBef>
-              <a:buNone/>
-            </a:pPr>
-            <a:r>
-              <a:rPr b="0" lang="en-US" sz="3200" spc="-1" strike="noStrike">
-                <a:solidFill>
-                  <a:schemeClr val="dk1"/>
-                </a:solidFill>
-                <a:latin typeface="Calibri"/>
-                <a:ea typeface="Noto Sans Mono CJK SC"/>
-              </a:rPr>
-              <a:t>ggplot(students, aes(x = Score)) +</a:t>
-            </a:r>
-            <a:endParaRPr b="0" lang="en-US" sz="3200" spc="-1" strike="noStrike">
-              <a:solidFill>
-                <a:srgbClr val="000000"/>
-              </a:solidFill>
-              <a:latin typeface="Arial"/>
-            </a:endParaRPr>
-          </a:p>
-          <a:p>
-            <a:pPr marL="343080" indent="0" defTabSz="457200">
-              <a:lnSpc>
-                <a:spcPct val="100000"/>
-              </a:lnSpc>
-              <a:spcBef>
-                <a:spcPts val="641"/>
-              </a:spcBef>
-              <a:buNone/>
-            </a:pPr>
-            <a:r>
-              <a:rPr b="0" lang="en-US" sz="3200" spc="-1" strike="noStrike">
-                <a:solidFill>
-                  <a:schemeClr val="dk1"/>
-                </a:solidFill>
-                <a:latin typeface="Calibri"/>
-                <a:ea typeface="Noto Sans Mono CJK SC"/>
-              </a:rPr>
-              <a:t>geom_histogram(binwidth = 5, fill = "orange", color = "black") +</a:t>
-            </a:r>
-            <a:endParaRPr b="0" lang="en-US" sz="3200" spc="-1" strike="noStrike">
-              <a:solidFill>
-                <a:srgbClr val="000000"/>
-              </a:solidFill>
-              <a:latin typeface="Arial"/>
-            </a:endParaRPr>
-          </a:p>
-          <a:p>
-            <a:pPr marL="343080" indent="0" defTabSz="457200">
-              <a:lnSpc>
-                <a:spcPct val="100000"/>
-              </a:lnSpc>
-              <a:spcBef>
-                <a:spcPts val="641"/>
-              </a:spcBef>
-              <a:buNone/>
-            </a:pPr>
-            <a:r>
-              <a:rPr b="0" lang="en-US" sz="3200" spc="-1" strike="noStrike">
-                <a:solidFill>
-                  <a:schemeClr val="dk1"/>
-                </a:solidFill>
-                <a:latin typeface="Calibri"/>
-                <a:ea typeface="Noto Sans Mono CJK SC"/>
-              </a:rPr>
-              <a:t>  </a:t>
-            </a:r>
-            <a:r>
-              <a:rPr b="0" lang="en-US" sz="3200" spc="-1" strike="noStrike">
-                <a:solidFill>
-                  <a:schemeClr val="dk1"/>
-                </a:solidFill>
-                <a:latin typeface="Calibri"/>
-                <a:ea typeface="Noto Sans Mono CJK SC"/>
-              </a:rPr>
-              <a:t>labs(title = "Distribution of Student Scores", x = "Score", y = "Frequency") +</a:t>
-            </a:r>
-            <a:endParaRPr b="0" lang="en-US" sz="3200" spc="-1" strike="noStrike">
-              <a:solidFill>
-                <a:srgbClr val="000000"/>
-              </a:solidFill>
-              <a:latin typeface="Arial"/>
-            </a:endParaRPr>
-          </a:p>
-          <a:p>
-            <a:pPr marL="343080" indent="0" defTabSz="457200">
-              <a:lnSpc>
-                <a:spcPct val="100000"/>
-              </a:lnSpc>
-              <a:spcBef>
-                <a:spcPts val="641"/>
-              </a:spcBef>
-              <a:buNone/>
-            </a:pPr>
-            <a:r>
-              <a:rPr b="0" lang="en-US" sz="3200" spc="-1" strike="noStrike">
-                <a:solidFill>
-                  <a:schemeClr val="dk1"/>
-                </a:solidFill>
-                <a:latin typeface="Calibri"/>
-                <a:ea typeface="Noto Sans Mono CJK SC"/>
-              </a:rPr>
-              <a:t>  </a:t>
-            </a:r>
-            <a:r>
-              <a:rPr b="0" lang="en-US" sz="3200" spc="-1" strike="noStrike">
-                <a:solidFill>
-                  <a:schemeClr val="dk1"/>
-                </a:solidFill>
-                <a:latin typeface="Calibri"/>
-                <a:ea typeface="Noto Sans Mono CJK SC"/>
-              </a:rPr>
-              <a:t>theme_minimal()</a:t>
-            </a:r>
-            <a:endParaRPr b="0" lang="en-US" sz="3200" spc="-1" strike="noStrike">
-              <a:solidFill>
-                <a:srgbClr val="000000"/>
-              </a:solidFill>
-              <a:latin typeface="Arial"/>
             </a:endParaRPr>
           </a:p>
         </p:txBody>
@@ -6375,40 +5612,6 @@
                 <a:latin typeface="Calibri"/>
               </a:rPr>
               <a:t>Multiple Linear Regression</a:t>
-            </a:r>
-            <a:endParaRPr b="0" lang="en-US" sz="3200" spc="-1" strike="noStrike">
-              <a:solidFill>
-                <a:srgbClr val="000000"/>
-              </a:solidFill>
-              <a:latin typeface="Arial"/>
-            </a:endParaRPr>
-          </a:p>
-          <a:p>
-            <a:pPr lvl="2" marL="343080" defTabSz="457200">
-              <a:lnSpc>
-                <a:spcPct val="100000"/>
-              </a:lnSpc>
-              <a:spcBef>
-                <a:spcPts val="850"/>
-              </a:spcBef>
-              <a:buClr>
-                <a:srgbClr val="000000"/>
-              </a:buClr>
-              <a:buSzPct val="45000"/>
-              <a:buFont typeface="Wingdings" charset="2"/>
-              <a:buChar char=""/>
-              <a:tabLst>
-                <a:tab algn="l" pos="0"/>
-              </a:tabLst>
-            </a:pPr>
-            <a:r>
-              <a:rPr b="0" lang="en-US" sz="3200" spc="-1" strike="noStrike">
-                <a:solidFill>
-                  <a:schemeClr val="dk1"/>
-                </a:solidFill>
-                <a:latin typeface="Calibri"/>
-              </a:rPr>
-              <a:t>Polynomial Regression</a:t>
             </a:r>
             <a:endParaRPr b="0" lang="en-US" sz="3200" spc="-1" strike="noStrike">
               <a:solidFill>
@@ -7699,7 +6902,16 @@
                 </a:solidFill>
                 <a:latin typeface="Arial"/>
               </a:rPr>
-              <a:t>model1 &lt;- lm(blood_pressure ~ age, data = health_data)</a:t>
+              <a:t>model1 &lt;- lm(blood_pressure ~ age, data </a:t>
+            </a:r>
+            <a:r>
+              <a:rPr b="0" lang="en-US" sz="3200" spc="-1" strike="noStrike">
+                <a:solidFill>
+                  <a:srgbClr val="000000"/>
+                </a:solidFill>
+                <a:latin typeface="Arial"/>
+              </a:rPr>
+              <a:t>= health_data)</a:t>
             </a:r>
             <a:endParaRPr b="0" lang="en-US" sz="3200" spc="-1" strike="noStrike">
               <a:solidFill>
@@ -7751,7 +6963,16 @@
                 </a:solidFill>
                 <a:latin typeface="Arial"/>
               </a:rPr>
-              <a:t>plot(health_data$age, health_data$blood_pressure)</a:t>
+              <a:t>plot(health_data$age, </a:t>
+            </a:r>
+            <a:r>
+              <a:rPr b="0" lang="en-US" sz="3200" spc="-1" strike="noStrike">
+                <a:solidFill>
+                  <a:srgbClr val="000000"/>
+                </a:solidFill>
+                <a:latin typeface="Arial"/>
+              </a:rPr>
+              <a:t>health_data$blood_pressure)</a:t>
             </a:r>
             <a:endParaRPr b="0" lang="en-US" sz="3200" spc="-1" strike="noStrike">
               <a:solidFill>
@@ -8121,27 +7342,7 @@
                 <a:latin typeface="Calibri"/>
                 <a:ea typeface="Noto Sans Mono CJK SC"/>
               </a:rPr>
-              <a:t>model3 &lt;- glm(has_diabetes ~ age + </a:t>
-            </a:r>
-            <a:r>
-              <a:rPr b="0" lang="en-US" sz="3200" spc="-1" strike="noStrike">
-                <a:solidFill>
-                  <a:schemeClr val="dk1"/>
-                </a:solidFill>
-                <a:latin typeface="Calibri"/>
-                <a:ea typeface="Noto Sans Mono CJK SC"/>
-              </a:rPr>
-              <a:t>bmi + smoker, data = health_data, </a:t>
-            </a:r>
-            <a:r>
-              <a:rPr b="0" lang="en-US" sz="3200" spc="-1" strike="noStrike">
-                <a:solidFill>
-                  <a:schemeClr val="dk1"/>
-                </a:solidFill>
-                <a:latin typeface="Calibri"/>
-                <a:ea typeface="Noto Sans Mono CJK SC"/>
-              </a:rPr>
-              <a:t>family = binomial)</a:t>
+              <a:t>model3 &lt;- glm(has_diabetes ~ age + bmi + smoker, data = health_data, family = binomial)</a:t>
             </a:r>
             <a:endParaRPr b="0" lang="en-US" sz="3200" spc="-1" strike="noStrike">
               <a:solidFill>
@@ -8276,17 +7477,7 @@
                 <a:latin typeface="Calibri"/>
                 <a:ea typeface="Noto Sans Mono CJK SC"/>
               </a:rPr>
-              <a:t>Use exp(coef(model3)) for odds </a:t>
-            </a:r>
-            <a:r>
-              <a:rPr b="0" lang="en-US" sz="3200" spc="-1" strike="noStrike">
-                <a:solidFill>
-                  <a:schemeClr val="dk1"/>
-                </a:solidFill>
-                <a:latin typeface="Calibri"/>
-                <a:ea typeface="Noto Sans Mono CJK SC"/>
-              </a:rPr>
-              <a:t>ratios</a:t>
+              <a:t>Use exp(coef(model3)) for odds ratios</a:t>
             </a:r>
             <a:endParaRPr b="0" lang="en-US" sz="3200" spc="-1" strike="noStrike">
               <a:solidFill>
@@ -8305,797 +7496,6 @@
               </a:spcBef>
               <a:buNone/>
             </a:pPr>
-            <a:endParaRPr b="0" lang="en-US" sz="3200" spc="-1" strike="noStrike">
-              <a:solidFill>
-                <a:srgbClr val="000000"/>
-              </a:solidFill>
-              <a:latin typeface="Arial"/>
-            </a:endParaRPr>
-          </a:p>
-        </p:txBody>
-      </p:sp>
-    </p:spTree>
-  </p:cSld>
-  <mc:AlternateContent>
-    <mc:Choice Requires="p14">
-      <p:transition spd="slow" p14:dur="2000"/>
-    </mc:Choice>
-    <mc:Fallback>
-      <p:transition spd="slow"/>
-    </mc:Fallback>
-  </mc:AlternateContent>
-</p:sld>
-</file>
-
-<file path=ppt/slides/slide7.xml><?xml version="1.0" encoding="utf-8"?>
-<p:sld xmlns:a="http://schemas.openxmlformats.org/drawingml/2006/main" xmlns:p="http://schemas.openxmlformats.org/presentationml/2006/main" xmlns:r="http://schemas.openxmlformats.org/officeDocument/2006/relationships" xmlns:p14="http://schemas.microsoft.com/office/powerpoint/2010/main" xmlns:p15="http://schemas.microsoft.com/office/powerpoint/2012/main" xmlns:mc="http://schemas.openxmlformats.org/markup-compatibility/2006">
-  <p:cSld>
-    <p:spTree>
-      <p:nvGrpSpPr>
-        <p:cNvPr id="1" name=""/>
-        <p:cNvGrpSpPr/>
-        <p:nvPr/>
-      </p:nvGrpSpPr>
-      <p:grpSpPr>
-        <a:xfrm>
-          <a:off x="0" y="0"/>
-          <a:ext cx="0" cy="0"/>
-          <a:chOff x="0" y="0"/>
-          <a:chExt cx="0" cy="0"/>
-        </a:xfrm>
-      </p:grpSpPr>
-      <p:sp>
-        <p:nvSpPr>
-          <p:cNvPr id="62" name="PlaceHolder 1"/>
-          <p:cNvSpPr>
-            <a:spLocks noGrp="1"/>
-          </p:cNvSpPr>
-          <p:nvPr>
-            <p:ph type="title"/>
-          </p:nvPr>
-        </p:nvSpPr>
-        <p:spPr>
-          <a:xfrm>
-            <a:off x="457200" y="274680"/>
-            <a:ext cx="8227080" cy="1140480"/>
-          </a:xfrm>
-          <a:prstGeom prst="rect">
-            <a:avLst/>
-          </a:prstGeom>
-          <a:noFill/>
-          <a:ln w="0">
-            <a:noFill/>
-          </a:ln>
-        </p:spPr>
-        <p:txBody>
-          <a:bodyPr lIns="91440" rIns="91440" tIns="45720" bIns="45720" anchor="ctr">
-            <a:noAutofit/>
-          </a:bodyPr>
-          <a:p>
-            <a:pPr indent="0" algn="ctr" defTabSz="457200">
-              <a:lnSpc>
-                <a:spcPct val="100000"/>
-              </a:lnSpc>
-              <a:spcBef>
-                <a:spcPts val="1191"/>
-              </a:spcBef>
-              <a:spcAft>
-                <a:spcPts val="992"/>
-              </a:spcAft>
-              <a:buNone/>
-              <a:tabLst>
-                <a:tab algn="l" pos="0"/>
-              </a:tabLst>
-            </a:pPr>
-            <a:r>
-              <a:rPr b="0" lang="en-US" sz="4400" spc="-1" strike="noStrike">
-                <a:solidFill>
-                  <a:schemeClr val="dk1"/>
-                </a:solidFill>
-                <a:latin typeface="Calibri"/>
-              </a:rPr>
-              <a:t>Bar Charts</a:t>
-            </a:r>
-            <a:endParaRPr b="0" lang="en-US" sz="4400" spc="-1" strike="noStrike">
-              <a:solidFill>
-                <a:srgbClr val="000000"/>
-              </a:solidFill>
-              <a:latin typeface="Arial"/>
-            </a:endParaRPr>
-          </a:p>
-        </p:txBody>
-      </p:sp>
-      <p:sp>
-        <p:nvSpPr>
-          <p:cNvPr id="63" name="PlaceHolder 2"/>
-          <p:cNvSpPr>
-            <a:spLocks noGrp="1"/>
-          </p:cNvSpPr>
-          <p:nvPr>
-            <p:ph/>
-          </p:nvPr>
-        </p:nvSpPr>
-        <p:spPr>
-          <a:xfrm>
-            <a:off x="457200" y="1600200"/>
-            <a:ext cx="8227080" cy="4523400"/>
-          </a:xfrm>
-          <a:prstGeom prst="rect">
-            <a:avLst/>
-          </a:prstGeom>
-          <a:noFill/>
-          <a:ln w="0">
-            <a:noFill/>
-          </a:ln>
-        </p:spPr>
-        <p:txBody>
-          <a:bodyPr lIns="91440" rIns="91440" tIns="45720" bIns="45720" anchor="t">
-            <a:noAutofit/>
-          </a:bodyPr>
-          <a:p>
-            <a:pPr marL="343080" indent="0" defTabSz="457200">
-              <a:lnSpc>
-                <a:spcPct val="100000"/>
-              </a:lnSpc>
-              <a:spcBef>
-                <a:spcPts val="641"/>
-              </a:spcBef>
-              <a:buNone/>
-            </a:pPr>
-            <a:r>
-              <a:rPr b="0" lang="en-US" sz="3200" spc="-1" strike="noStrike">
-                <a:solidFill>
-                  <a:schemeClr val="dk1"/>
-                </a:solidFill>
-                <a:latin typeface="Calibri"/>
-                <a:ea typeface="Noto Sans Mono CJK SC"/>
-              </a:rPr>
-              <a:t>ggplot(students, aes(x = Programme)) +</a:t>
-            </a:r>
-            <a:endParaRPr b="0" lang="en-US" sz="3200" spc="-1" strike="noStrike">
-              <a:solidFill>
-                <a:srgbClr val="000000"/>
-              </a:solidFill>
-              <a:latin typeface="Arial"/>
-            </a:endParaRPr>
-          </a:p>
-          <a:p>
-            <a:pPr marL="343080" indent="0" defTabSz="457200">
-              <a:lnSpc>
-                <a:spcPct val="100000"/>
-              </a:lnSpc>
-              <a:spcBef>
-                <a:spcPts val="641"/>
-              </a:spcBef>
-              <a:buNone/>
-            </a:pPr>
-            <a:r>
-              <a:rPr b="0" lang="en-US" sz="3200" spc="-1" strike="noStrike">
-                <a:solidFill>
-                  <a:schemeClr val="dk1"/>
-                </a:solidFill>
-                <a:latin typeface="Calibri"/>
-                <a:ea typeface="Noto Sans Mono CJK SC"/>
-              </a:rPr>
-              <a:t>  </a:t>
-            </a:r>
-            <a:r>
-              <a:rPr b="0" lang="en-US" sz="3200" spc="-1" strike="noStrike">
-                <a:solidFill>
-                  <a:schemeClr val="dk1"/>
-                </a:solidFill>
-                <a:latin typeface="Calibri"/>
-                <a:ea typeface="Noto Sans Mono CJK SC"/>
-              </a:rPr>
-              <a:t>geom_bar(fill = "skyblue") +</a:t>
-            </a:r>
-            <a:endParaRPr b="0" lang="en-US" sz="3200" spc="-1" strike="noStrike">
-              <a:solidFill>
-                <a:srgbClr val="000000"/>
-              </a:solidFill>
-              <a:latin typeface="Arial"/>
-            </a:endParaRPr>
-          </a:p>
-          <a:p>
-            <a:pPr marL="343080" indent="0" defTabSz="457200">
-              <a:lnSpc>
-                <a:spcPct val="100000"/>
-              </a:lnSpc>
-              <a:spcBef>
-                <a:spcPts val="641"/>
-              </a:spcBef>
-              <a:buNone/>
-            </a:pPr>
-            <a:r>
-              <a:rPr b="0" lang="en-US" sz="3200" spc="-1" strike="noStrike">
-                <a:solidFill>
-                  <a:schemeClr val="dk1"/>
-                </a:solidFill>
-                <a:latin typeface="Calibri"/>
-                <a:ea typeface="Noto Sans Mono CJK SC"/>
-              </a:rPr>
-              <a:t>  </a:t>
-            </a:r>
-            <a:r>
-              <a:rPr b="0" lang="en-US" sz="3200" spc="-1" strike="noStrike">
-                <a:solidFill>
-                  <a:schemeClr val="dk1"/>
-                </a:solidFill>
-                <a:latin typeface="Calibri"/>
-                <a:ea typeface="Noto Sans Mono CJK SC"/>
-              </a:rPr>
-              <a:t>labs(title = "Student Count by Programme", x = "Programme", y = "Count") +</a:t>
-            </a:r>
-            <a:endParaRPr b="0" lang="en-US" sz="3200" spc="-1" strike="noStrike">
-              <a:solidFill>
-                <a:srgbClr val="000000"/>
-              </a:solidFill>
-              <a:latin typeface="Arial"/>
-            </a:endParaRPr>
-          </a:p>
-          <a:p>
-            <a:pPr marL="343080" indent="0" defTabSz="457200">
-              <a:lnSpc>
-                <a:spcPct val="100000"/>
-              </a:lnSpc>
-              <a:spcBef>
-                <a:spcPts val="641"/>
-              </a:spcBef>
-              <a:buNone/>
-            </a:pPr>
-            <a:r>
-              <a:rPr b="0" lang="en-US" sz="3200" spc="-1" strike="noStrike">
-                <a:solidFill>
-                  <a:schemeClr val="dk1"/>
-                </a:solidFill>
-                <a:latin typeface="Calibri"/>
-                <a:ea typeface="Noto Sans Mono CJK SC"/>
-              </a:rPr>
-              <a:t>  </a:t>
-            </a:r>
-            <a:r>
-              <a:rPr b="0" lang="en-US" sz="3200" spc="-1" strike="noStrike">
-                <a:solidFill>
-                  <a:schemeClr val="dk1"/>
-                </a:solidFill>
-                <a:latin typeface="Calibri"/>
-                <a:ea typeface="Noto Sans Mono CJK SC"/>
-              </a:rPr>
-              <a:t>theme_minimal()</a:t>
-            </a:r>
-            <a:endParaRPr b="0" lang="en-US" sz="3200" spc="-1" strike="noStrike">
-              <a:solidFill>
-                <a:srgbClr val="000000"/>
-              </a:solidFill>
-              <a:latin typeface="Arial"/>
-            </a:endParaRPr>
-          </a:p>
-        </p:txBody>
-      </p:sp>
-    </p:spTree>
-  </p:cSld>
-  <mc:AlternateContent>
-    <mc:Choice Requires="p14">
-      <p:transition spd="slow" p14:dur="2000"/>
-    </mc:Choice>
-    <mc:Fallback>
-      <p:transition spd="slow"/>
-    </mc:Fallback>
-  </mc:AlternateContent>
-</p:sld>
-</file>
-
-<file path=ppt/slides/slide8.xml><?xml version="1.0" encoding="utf-8"?>
-<p:sld xmlns:a="http://schemas.openxmlformats.org/drawingml/2006/main" xmlns:p="http://schemas.openxmlformats.org/presentationml/2006/main" xmlns:r="http://schemas.openxmlformats.org/officeDocument/2006/relationships" xmlns:p14="http://schemas.microsoft.com/office/powerpoint/2010/main" xmlns:p15="http://schemas.microsoft.com/office/powerpoint/2012/main" xmlns:mc="http://schemas.openxmlformats.org/markup-compatibility/2006">
-  <p:cSld>
-    <p:spTree>
-      <p:nvGrpSpPr>
-        <p:cNvPr id="1" name=""/>
-        <p:cNvGrpSpPr/>
-        <p:nvPr/>
-      </p:nvGrpSpPr>
-      <p:grpSpPr>
-        <a:xfrm>
-          <a:off x="0" y="0"/>
-          <a:ext cx="0" cy="0"/>
-          <a:chOff x="0" y="0"/>
-          <a:chExt cx="0" cy="0"/>
-        </a:xfrm>
-      </p:grpSpPr>
-      <p:sp>
-        <p:nvSpPr>
-          <p:cNvPr id="64" name="PlaceHolder 1"/>
-          <p:cNvSpPr>
-            <a:spLocks noGrp="1"/>
-          </p:cNvSpPr>
-          <p:nvPr>
-            <p:ph type="title"/>
-          </p:nvPr>
-        </p:nvSpPr>
-        <p:spPr>
-          <a:xfrm>
-            <a:off x="457200" y="274680"/>
-            <a:ext cx="8227080" cy="1140480"/>
-          </a:xfrm>
-          <a:prstGeom prst="rect">
-            <a:avLst/>
-          </a:prstGeom>
-          <a:noFill/>
-          <a:ln w="0">
-            <a:noFill/>
-          </a:ln>
-        </p:spPr>
-        <p:txBody>
-          <a:bodyPr lIns="91440" rIns="91440" tIns="45720" bIns="45720" anchor="ctr">
-            <a:noAutofit/>
-          </a:bodyPr>
-          <a:p>
-            <a:pPr indent="0" algn="ctr" defTabSz="457200">
-              <a:lnSpc>
-                <a:spcPct val="100000"/>
-              </a:lnSpc>
-              <a:spcBef>
-                <a:spcPts val="1191"/>
-              </a:spcBef>
-              <a:spcAft>
-                <a:spcPts val="992"/>
-              </a:spcAft>
-              <a:buNone/>
-              <a:tabLst>
-                <a:tab algn="l" pos="0"/>
-              </a:tabLst>
-            </a:pPr>
-            <a:r>
-              <a:rPr b="0" lang="en-US" sz="4400" spc="-1" strike="noStrike">
-                <a:solidFill>
-                  <a:srgbClr val="000000"/>
-                </a:solidFill>
-                <a:latin typeface="Calibri"/>
-              </a:rPr>
-              <a:t>Stacked Bar Plot – Gender Distribution by Programme</a:t>
-            </a:r>
-            <a:endParaRPr b="0" lang="en-US" sz="4400" spc="-1" strike="noStrike">
-              <a:solidFill>
-                <a:srgbClr val="000000"/>
-              </a:solidFill>
-              <a:latin typeface="Calibri"/>
-            </a:endParaRPr>
-          </a:p>
-        </p:txBody>
-      </p:sp>
-      <p:sp>
-        <p:nvSpPr>
-          <p:cNvPr id="65" name="PlaceHolder 2"/>
-          <p:cNvSpPr>
-            <a:spLocks noGrp="1"/>
-          </p:cNvSpPr>
-          <p:nvPr>
-            <p:ph/>
-          </p:nvPr>
-        </p:nvSpPr>
-        <p:spPr>
-          <a:xfrm>
-            <a:off x="457200" y="1600200"/>
-            <a:ext cx="8227080" cy="4523400"/>
-          </a:xfrm>
-          <a:prstGeom prst="rect">
-            <a:avLst/>
-          </a:prstGeom>
-          <a:noFill/>
-          <a:ln w="0">
-            <a:noFill/>
-          </a:ln>
-        </p:spPr>
-        <p:txBody>
-          <a:bodyPr lIns="91440" rIns="91440" tIns="45720" bIns="45720" anchor="t">
-            <a:noAutofit/>
-          </a:bodyPr>
-          <a:p>
-            <a:pPr marL="343080" indent="0" defTabSz="457200">
-              <a:lnSpc>
-                <a:spcPct val="100000"/>
-              </a:lnSpc>
-              <a:spcBef>
-                <a:spcPts val="641"/>
-              </a:spcBef>
-              <a:buNone/>
-            </a:pPr>
-            <a:r>
-              <a:rPr b="0" lang="en-US" sz="3200" spc="-1" strike="noStrike">
-                <a:solidFill>
-                  <a:schemeClr val="dk1"/>
-                </a:solidFill>
-                <a:latin typeface="Calibri"/>
-                <a:ea typeface="Noto Sans Mono CJK SC"/>
-              </a:rPr>
-              <a:t>ggplot(students, aes(x = Programme, fill = Gender)) +</a:t>
-            </a:r>
-            <a:endParaRPr b="0" lang="en-US" sz="3200" spc="-1" strike="noStrike">
-              <a:solidFill>
-                <a:srgbClr val="000000"/>
-              </a:solidFill>
-              <a:latin typeface="Arial"/>
-            </a:endParaRPr>
-          </a:p>
-          <a:p>
-            <a:pPr marL="343080" indent="0" defTabSz="457200">
-              <a:lnSpc>
-                <a:spcPct val="100000"/>
-              </a:lnSpc>
-              <a:spcBef>
-                <a:spcPts val="641"/>
-              </a:spcBef>
-              <a:buNone/>
-            </a:pPr>
-            <a:r>
-              <a:rPr b="0" lang="en-US" sz="3200" spc="-1" strike="noStrike">
-                <a:solidFill>
-                  <a:schemeClr val="dk1"/>
-                </a:solidFill>
-                <a:latin typeface="Calibri"/>
-                <a:ea typeface="Noto Sans Mono CJK SC"/>
-              </a:rPr>
-              <a:t>  </a:t>
-            </a:r>
-            <a:r>
-              <a:rPr b="0" lang="en-US" sz="3200" spc="-1" strike="noStrike">
-                <a:solidFill>
-                  <a:schemeClr val="dk1"/>
-                </a:solidFill>
-                <a:latin typeface="Calibri"/>
-                <a:ea typeface="Noto Sans Mono CJK SC"/>
-              </a:rPr>
-              <a:t>geom_bar(position = "fill") +  # use "dodge" for side-by-side</a:t>
-            </a:r>
-            <a:endParaRPr b="0" lang="en-US" sz="3200" spc="-1" strike="noStrike">
-              <a:solidFill>
-                <a:srgbClr val="000000"/>
-              </a:solidFill>
-              <a:latin typeface="Arial"/>
-            </a:endParaRPr>
-          </a:p>
-          <a:p>
-            <a:pPr marL="343080" indent="0" defTabSz="457200">
-              <a:lnSpc>
-                <a:spcPct val="100000"/>
-              </a:lnSpc>
-              <a:spcBef>
-                <a:spcPts val="641"/>
-              </a:spcBef>
-              <a:buNone/>
-            </a:pPr>
-            <a:r>
-              <a:rPr b="0" lang="en-US" sz="3200" spc="-1" strike="noStrike">
-                <a:solidFill>
-                  <a:schemeClr val="dk1"/>
-                </a:solidFill>
-                <a:latin typeface="Calibri"/>
-                <a:ea typeface="Noto Sans Mono CJK SC"/>
-              </a:rPr>
-              <a:t>  </a:t>
-            </a:r>
-            <a:r>
-              <a:rPr b="0" lang="en-US" sz="3200" spc="-1" strike="noStrike">
-                <a:solidFill>
-                  <a:schemeClr val="dk1"/>
-                </a:solidFill>
-                <a:latin typeface="Calibri"/>
-                <a:ea typeface="Noto Sans Mono CJK SC"/>
-              </a:rPr>
-              <a:t>labs(title = "Gender Proportion by Programme", y = "Proportion") +</a:t>
-            </a:r>
-            <a:endParaRPr b="0" lang="en-US" sz="3200" spc="-1" strike="noStrike">
-              <a:solidFill>
-                <a:srgbClr val="000000"/>
-              </a:solidFill>
-              <a:latin typeface="Arial"/>
-            </a:endParaRPr>
-          </a:p>
-          <a:p>
-            <a:pPr marL="343080" indent="0" defTabSz="457200">
-              <a:lnSpc>
-                <a:spcPct val="100000"/>
-              </a:lnSpc>
-              <a:spcBef>
-                <a:spcPts val="641"/>
-              </a:spcBef>
-              <a:buNone/>
-            </a:pPr>
-            <a:r>
-              <a:rPr b="0" lang="en-US" sz="3200" spc="-1" strike="noStrike">
-                <a:solidFill>
-                  <a:schemeClr val="dk1"/>
-                </a:solidFill>
-                <a:latin typeface="Calibri"/>
-                <a:ea typeface="Noto Sans Mono CJK SC"/>
-              </a:rPr>
-              <a:t>  </a:t>
-            </a:r>
-            <a:r>
-              <a:rPr b="0" lang="en-US" sz="3200" spc="-1" strike="noStrike">
-                <a:solidFill>
-                  <a:schemeClr val="dk1"/>
-                </a:solidFill>
-                <a:latin typeface="Calibri"/>
-                <a:ea typeface="Noto Sans Mono CJK SC"/>
-              </a:rPr>
-              <a:t>scale_y_continuous(labels = scales::percent_format()) +</a:t>
-            </a:r>
-            <a:endParaRPr b="0" lang="en-US" sz="3200" spc="-1" strike="noStrike">
-              <a:solidFill>
-                <a:srgbClr val="000000"/>
-              </a:solidFill>
-              <a:latin typeface="Arial"/>
-            </a:endParaRPr>
-          </a:p>
-          <a:p>
-            <a:pPr marL="343080" indent="0" defTabSz="457200">
-              <a:lnSpc>
-                <a:spcPct val="100000"/>
-              </a:lnSpc>
-              <a:spcBef>
-                <a:spcPts val="641"/>
-              </a:spcBef>
-              <a:buNone/>
-            </a:pPr>
-            <a:r>
-              <a:rPr b="0" lang="en-US" sz="3200" spc="-1" strike="noStrike">
-                <a:solidFill>
-                  <a:schemeClr val="dk1"/>
-                </a:solidFill>
-                <a:latin typeface="Calibri"/>
-                <a:ea typeface="Noto Sans Mono CJK SC"/>
-              </a:rPr>
-              <a:t>  </a:t>
-            </a:r>
-            <a:r>
-              <a:rPr b="0" lang="en-US" sz="3200" spc="-1" strike="noStrike">
-                <a:solidFill>
-                  <a:schemeClr val="dk1"/>
-                </a:solidFill>
-                <a:latin typeface="Calibri"/>
-                <a:ea typeface="Noto Sans Mono CJK SC"/>
-              </a:rPr>
-              <a:t>theme_minimal()</a:t>
-            </a:r>
-            <a:endParaRPr b="0" lang="en-US" sz="3200" spc="-1" strike="noStrike">
-              <a:solidFill>
-                <a:srgbClr val="000000"/>
-              </a:solidFill>
-              <a:latin typeface="Arial"/>
-            </a:endParaRPr>
-          </a:p>
-        </p:txBody>
-      </p:sp>
-    </p:spTree>
-  </p:cSld>
-  <mc:AlternateContent>
-    <mc:Choice Requires="p14">
-      <p:transition spd="slow" p14:dur="2000"/>
-    </mc:Choice>
-    <mc:Fallback>
-      <p:transition spd="slow"/>
-    </mc:Fallback>
-  </mc:AlternateContent>
-</p:sld>
-</file>
-
-<file path=ppt/slides/slide9.xml><?xml version="1.0" encoding="utf-8"?>
-<p:sld xmlns:a="http://schemas.openxmlformats.org/drawingml/2006/main" xmlns:p="http://schemas.openxmlformats.org/presentationml/2006/main" xmlns:r="http://schemas.openxmlformats.org/officeDocument/2006/relationships" xmlns:p14="http://schemas.microsoft.com/office/powerpoint/2010/main" xmlns:p15="http://schemas.microsoft.com/office/powerpoint/2012/main" xmlns:mc="http://schemas.openxmlformats.org/markup-compatibility/2006">
-  <p:cSld>
-    <p:spTree>
-      <p:nvGrpSpPr>
-        <p:cNvPr id="1" name=""/>
-        <p:cNvGrpSpPr/>
-        <p:nvPr/>
-      </p:nvGrpSpPr>
-      <p:grpSpPr>
-        <a:xfrm>
-          <a:off x="0" y="0"/>
-          <a:ext cx="0" cy="0"/>
-          <a:chOff x="0" y="0"/>
-          <a:chExt cx="0" cy="0"/>
-        </a:xfrm>
-      </p:grpSpPr>
-      <p:sp>
-        <p:nvSpPr>
-          <p:cNvPr id="66" name="PlaceHolder 1"/>
-          <p:cNvSpPr>
-            <a:spLocks noGrp="1"/>
-          </p:cNvSpPr>
-          <p:nvPr>
-            <p:ph type="title"/>
-          </p:nvPr>
-        </p:nvSpPr>
-        <p:spPr>
-          <a:xfrm>
-            <a:off x="457200" y="274680"/>
-            <a:ext cx="8227080" cy="1140480"/>
-          </a:xfrm>
-          <a:prstGeom prst="rect">
-            <a:avLst/>
-          </a:prstGeom>
-          <a:noFill/>
-          <a:ln w="0">
-            <a:noFill/>
-          </a:ln>
-        </p:spPr>
-        <p:txBody>
-          <a:bodyPr lIns="91440" rIns="91440" tIns="45720" bIns="45720" anchor="ctr">
-            <a:noAutofit/>
-          </a:bodyPr>
-          <a:p>
-            <a:pPr indent="0" algn="ctr" defTabSz="457200">
-              <a:lnSpc>
-                <a:spcPct val="100000"/>
-              </a:lnSpc>
-              <a:spcBef>
-                <a:spcPts val="1191"/>
-              </a:spcBef>
-              <a:spcAft>
-                <a:spcPts val="992"/>
-              </a:spcAft>
-              <a:buNone/>
-              <a:tabLst>
-                <a:tab algn="l" pos="0"/>
-              </a:tabLst>
-            </a:pPr>
-            <a:r>
-              <a:rPr b="0" lang="en-US" sz="4400" spc="-1" strike="noStrike">
-                <a:solidFill>
-                  <a:srgbClr val="000000"/>
-                </a:solidFill>
-                <a:latin typeface="Calibri"/>
-              </a:rPr>
-              <a:t>Boxplot – Score by Year of Study</a:t>
-            </a:r>
-            <a:endParaRPr b="0" lang="en-US" sz="4400" spc="-1" strike="noStrike">
-              <a:solidFill>
-                <a:srgbClr val="000000"/>
-              </a:solidFill>
-              <a:latin typeface="Arial"/>
-            </a:endParaRPr>
-          </a:p>
-        </p:txBody>
-      </p:sp>
-      <p:sp>
-        <p:nvSpPr>
-          <p:cNvPr id="67" name="PlaceHolder 2"/>
-          <p:cNvSpPr>
-            <a:spLocks noGrp="1"/>
-          </p:cNvSpPr>
-          <p:nvPr>
-            <p:ph/>
-          </p:nvPr>
-        </p:nvSpPr>
-        <p:spPr>
-          <a:xfrm>
-            <a:off x="457200" y="1600200"/>
-            <a:ext cx="8227080" cy="4523400"/>
-          </a:xfrm>
-          <a:prstGeom prst="rect">
-            <a:avLst/>
-          </a:prstGeom>
-          <a:noFill/>
-          <a:ln w="0">
-            <a:noFill/>
-          </a:ln>
-        </p:spPr>
-        <p:txBody>
-          <a:bodyPr lIns="91440" rIns="91440" tIns="45720" bIns="45720" anchor="t">
-            <a:noAutofit/>
-          </a:bodyPr>
-          <a:p>
-            <a:pPr marL="343080" indent="0" defTabSz="457200">
-              <a:lnSpc>
-                <a:spcPct val="100000"/>
-              </a:lnSpc>
-              <a:spcBef>
-                <a:spcPts val="641"/>
-              </a:spcBef>
-              <a:buNone/>
-            </a:pPr>
-            <a:r>
-              <a:rPr b="0" lang="en-US" sz="3200" spc="-1" strike="noStrike">
-                <a:solidFill>
-                  <a:schemeClr val="dk1"/>
-                </a:solidFill>
-                <a:latin typeface="Calibri"/>
-                <a:ea typeface="Noto Sans Mono CJK SC"/>
-              </a:rPr>
-              <a:t>ggplot(students, aes(x = YearOfStudy, y = Score)) +</a:t>
-            </a:r>
-            <a:endParaRPr b="0" lang="en-US" sz="3200" spc="-1" strike="noStrike">
-              <a:solidFill>
-                <a:srgbClr val="000000"/>
-              </a:solidFill>
-              <a:latin typeface="Arial"/>
-            </a:endParaRPr>
-          </a:p>
-          <a:p>
-            <a:pPr marL="343080" indent="0" defTabSz="457200">
-              <a:lnSpc>
-                <a:spcPct val="100000"/>
-              </a:lnSpc>
-              <a:spcBef>
-                <a:spcPts val="641"/>
-              </a:spcBef>
-              <a:buNone/>
-            </a:pPr>
-            <a:r>
-              <a:rPr b="0" lang="en-US" sz="3200" spc="-1" strike="noStrike">
-                <a:solidFill>
-                  <a:schemeClr val="dk1"/>
-                </a:solidFill>
-                <a:latin typeface="Calibri"/>
-                <a:ea typeface="Noto Sans Mono CJK SC"/>
-              </a:rPr>
-              <a:t>geom_boxplot(fill = "lightgreen") +</a:t>
-            </a:r>
-            <a:endParaRPr b="0" lang="en-US" sz="3200" spc="-1" strike="noStrike">
-              <a:solidFill>
-                <a:srgbClr val="000000"/>
-              </a:solidFill>
-              <a:latin typeface="Arial"/>
-            </a:endParaRPr>
-          </a:p>
-          <a:p>
-            <a:pPr marL="343080" indent="0" defTabSz="457200">
-              <a:lnSpc>
-                <a:spcPct val="100000"/>
-              </a:lnSpc>
-              <a:spcBef>
-                <a:spcPts val="641"/>
-              </a:spcBef>
-              <a:buNone/>
-            </a:pPr>
-            <a:r>
-              <a:rPr b="0" lang="en-US" sz="3200" spc="-1" strike="noStrike">
-                <a:solidFill>
-                  <a:schemeClr val="dk1"/>
-                </a:solidFill>
-                <a:latin typeface="Calibri"/>
-                <a:ea typeface="Noto Sans Mono CJK SC"/>
-              </a:rPr>
-              <a:t> </a:t>
-            </a:r>
-            <a:r>
-              <a:rPr b="0" lang="en-US" sz="3200" spc="-1" strike="noStrike">
-                <a:solidFill>
-                  <a:schemeClr val="dk1"/>
-                </a:solidFill>
-                <a:latin typeface="Calibri"/>
-                <a:ea typeface="Noto Sans Mono CJK SC"/>
-              </a:rPr>
-              <a:t>labs(title = "Score Distribution by Year of Study", x = "Year", y = "Score") +</a:t>
-            </a:r>
-            <a:endParaRPr b="0" lang="en-US" sz="3200" spc="-1" strike="noStrike">
-              <a:solidFill>
-                <a:srgbClr val="000000"/>
-              </a:solidFill>
-              <a:latin typeface="Arial"/>
-            </a:endParaRPr>
-          </a:p>
-          <a:p>
-            <a:pPr marL="343080" indent="0" defTabSz="457200">
-              <a:lnSpc>
-                <a:spcPct val="100000"/>
-              </a:lnSpc>
-              <a:spcBef>
-                <a:spcPts val="641"/>
-              </a:spcBef>
-              <a:buNone/>
-            </a:pPr>
-            <a:r>
-              <a:rPr b="0" lang="en-US" sz="3200" spc="-1" strike="noStrike">
-                <a:solidFill>
-                  <a:schemeClr val="dk1"/>
-                </a:solidFill>
-                <a:latin typeface="Calibri"/>
-                <a:ea typeface="Noto Sans Mono CJK SC"/>
-              </a:rPr>
-              <a:t>theme_minimal()</a:t>
-            </a:r>
             <a:endParaRPr b="0" lang="en-US" sz="3200" spc="-1" strike="noStrike">
               <a:solidFill>
                 <a:srgbClr val="000000"/>

</xml_diff>